<commit_message>
update PhEDEx total volume plot. Update PPT with new PhEDEx plot and new diagrams/plots from Valentin
</commit_message>
<xml_diff>
--- a/CMS-Data-Management/Slides/The CMS Data Management System.pptx
+++ b/CMS-Data-Management/Slides/The CMS Data Management System.pptx
@@ -896,6 +896,76 @@
           <a:bodyPr/>
           <a:lstStyle/>
           <a:p>
+            <a:r>
+              <a:rPr lang="en-GB" dirty="0" smtClean="0"/>
+              <a:t>The plo</a:t>
+            </a:r>
+            <a:r>
+              <a:rPr lang="en-GB" sz="1200" dirty="0" smtClean="0">
+                <a:effectLst/>
+              </a:rPr>
+              <a:t>t shows number of daily queries in DAS for this year. The plot only shows input query rate, which needs to be multiplied by factor of O(10-1000) to resolve the results for this query. In other words, individual DAS query may yield O(10-10000) results which are processed in real time (fetched from multiple sources, decoded, processed and displayed back to the user). On average we have around O(10M) results going in/out into DAS cache on a daily basis. CPU/</a:t>
+            </a:r>
+            <a:r>
+              <a:rPr lang="en-GB" sz="1200" dirty="0" err="1" smtClean="0">
+                <a:effectLst/>
+              </a:rPr>
+              <a:t>mem</a:t>
+            </a:r>
+            <a:r>
+              <a:rPr lang="en-GB" sz="1200" dirty="0" smtClean="0">
+                <a:effectLst/>
+              </a:rPr>
+              <a:t> plots are irrelevant since DAS runs on shared node with other services (</a:t>
+            </a:r>
+            <a:r>
+              <a:rPr lang="en-GB" sz="1200" dirty="0" err="1" smtClean="0">
+                <a:effectLst/>
+              </a:rPr>
+              <a:t>CouchDB</a:t>
+            </a:r>
+            <a:r>
+              <a:rPr lang="en-GB" sz="1200" dirty="0" smtClean="0">
+                <a:effectLst/>
+              </a:rPr>
+              <a:t>, </a:t>
+            </a:r>
+            <a:r>
+              <a:rPr lang="en-GB" sz="1200" dirty="0" err="1" smtClean="0">
+                <a:effectLst/>
+              </a:rPr>
+              <a:t>ReqMgr</a:t>
+            </a:r>
+            <a:r>
+              <a:rPr lang="en-GB" sz="1200" dirty="0" smtClean="0">
+                <a:effectLst/>
+              </a:rPr>
+              <a:t>, </a:t>
+            </a:r>
+            <a:r>
+              <a:rPr lang="en-GB" sz="1200" dirty="0" err="1" smtClean="0">
+                <a:effectLst/>
+              </a:rPr>
+              <a:t>FileMover</a:t>
+            </a:r>
+            <a:r>
+              <a:rPr lang="en-GB" sz="1200" dirty="0" smtClean="0">
+                <a:effectLst/>
+              </a:rPr>
+              <a:t>, </a:t>
+            </a:r>
+            <a:r>
+              <a:rPr lang="en-GB" sz="1200" dirty="0" err="1" smtClean="0">
+                <a:effectLst/>
+              </a:rPr>
+              <a:t>etc</a:t>
+            </a:r>
+            <a:r>
+              <a:rPr lang="en-GB" sz="1200" dirty="0" smtClean="0">
+                <a:effectLst/>
+              </a:rPr>
+              <a:t>).</a:t>
+            </a:r>
             <a:endParaRPr lang="en-GB" dirty="0"/>
           </a:p>
         </p:txBody>
@@ -8738,14 +8808,14 @@
       </p:sp>
       <p:pic>
         <p:nvPicPr>
-          <p:cNvPr id="7" name="Picture 6" descr="All-PhEDEx-transfers.png"/>
+          <p:cNvPr id="9" name="Picture 8" descr="All-PhEDEx-transfers.bmp"/>
           <p:cNvPicPr>
             <a:picLocks noChangeAspect="1"/>
           </p:cNvPicPr>
           <p:nvPr/>
         </p:nvPicPr>
         <p:blipFill>
-          <a:blip r:embed="rId3">
+          <a:blip r:embed="rId3" cstate="print">
             <a:extLst>
               <a:ext uri="{28A0092B-C50C-407E-A947-70E740481C1C}">
                 <a14:useLocalDpi xmlns:a14="http://schemas.microsoft.com/office/drawing/2010/main" val="0"/>
@@ -8766,44 +8836,6 @@
           </a:prstGeom>
         </p:spPr>
       </p:pic>
-      <p:sp>
-        <p:nvSpPr>
-          <p:cNvPr id="6" name="TextBox 5"/>
-          <p:cNvSpPr txBox="1"/>
-          <p:nvPr/>
-        </p:nvSpPr>
-        <p:spPr>
-          <a:xfrm>
-            <a:off x="-491009" y="5789711"/>
-            <a:ext cx="4772461" cy="523220"/>
-          </a:xfrm>
-          <a:prstGeom prst="rect">
-            <a:avLst/>
-          </a:prstGeom>
-          <a:noFill/>
-        </p:spPr>
-        <p:txBody>
-          <a:bodyPr wrap="none" rtlCol="0">
-            <a:spAutoFit/>
-          </a:bodyPr>
-          <a:lstStyle/>
-          <a:p>
-            <a:r>
-              <a:rPr lang="en-US" sz="2800" b="1" dirty="0" smtClean="0">
-                <a:latin typeface="Verdana" panose="020B0604030504040204" pitchFamily="34" charset="0"/>
-                <a:ea typeface="Verdana" panose="020B0604030504040204" pitchFamily="34" charset="0"/>
-                <a:cs typeface="Verdana" panose="020B0604030504040204" pitchFamily="34" charset="0"/>
-              </a:rPr>
-              <a:t>NOTE: UPDATE PLOT!!!</a:t>
-            </a:r>
-            <a:endParaRPr lang="en-GB" sz="2800" b="1" dirty="0">
-              <a:latin typeface="Verdana" panose="020B0604030504040204" pitchFamily="34" charset="0"/>
-              <a:ea typeface="Verdana" panose="020B0604030504040204" pitchFamily="34" charset="0"/>
-              <a:cs typeface="Verdana" panose="020B0604030504040204" pitchFamily="34" charset="0"/>
-            </a:endParaRPr>
-          </a:p>
-        </p:txBody>
-      </p:sp>
     </p:spTree>
     <p:extLst>
       <p:ext uri="{BB962C8B-B14F-4D97-AF65-F5344CB8AC3E}">
@@ -9914,60 +9946,6 @@
           <a:chExt cx="0" cy="0"/>
         </a:xfrm>
       </p:grpSpPr>
-      <p:pic>
-        <p:nvPicPr>
-          <p:cNvPr id="9" name="Picture 2"/>
-          <p:cNvPicPr>
-            <a:picLocks noChangeAspect="1" noChangeArrowheads="1"/>
-          </p:cNvPicPr>
-          <p:nvPr/>
-        </p:nvPicPr>
-        <p:blipFill>
-          <a:blip r:embed="rId3">
-            <a:extLst>
-              <a:ext uri="{28A0092B-C50C-407E-A947-70E740481C1C}">
-                <a14:useLocalDpi xmlns:a14="http://schemas.microsoft.com/office/drawing/2010/main" val="0"/>
-              </a:ext>
-            </a:extLst>
-          </a:blip>
-          <a:srcRect/>
-          <a:stretch>
-            <a:fillRect/>
-          </a:stretch>
-        </p:blipFill>
-        <p:spPr bwMode="auto">
-          <a:xfrm>
-            <a:off x="3657600" y="914400"/>
-            <a:ext cx="5999922" cy="4800600"/>
-          </a:xfrm>
-          <a:prstGeom prst="rect">
-            <a:avLst/>
-          </a:prstGeom>
-          <a:noFill/>
-          <a:ln>
-            <a:noFill/>
-          </a:ln>
-          <a:extLst>
-            <a:ext uri="{909E8E84-426E-40dd-AFC4-6F175D3DCCD1}">
-              <a14:hiddenFill xmlns:a14="http://schemas.microsoft.com/office/drawing/2010/main">
-                <a:solidFill>
-                  <a:schemeClr val="accent1"/>
-                </a:solidFill>
-              </a14:hiddenFill>
-            </a:ext>
-            <a:ext uri="{91240B29-F687-4f45-9708-019B960494DF}">
-              <a14:hiddenLine xmlns:a14="http://schemas.microsoft.com/office/drawing/2010/main" w="9525">
-                <a:solidFill>
-                  <a:schemeClr val="tx1"/>
-                </a:solidFill>
-                <a:miter lim="800000"/>
-                <a:headEnd/>
-                <a:tailEnd/>
-              </a14:hiddenLine>
-            </a:ext>
-          </a:extLst>
-        </p:spPr>
-      </p:pic>
       <p:sp>
         <p:nvSpPr>
           <p:cNvPr id="2" name="Date Placeholder 1"/>
@@ -10467,11 +10445,60 @@
             <a:pPr lvl="1"/>
             <a:r>
               <a:rPr lang="en-US" sz="2000" dirty="0" smtClean="0"/>
-              <a:t>For caching and storing aggregated results</a:t>
-            </a:r>
-          </a:p>
-        </p:txBody>
-      </p:sp>
+              <a:t>For caching </a:t>
+            </a:r>
+            <a:r>
+              <a:rPr lang="en-US" sz="2000" dirty="0" smtClean="0"/>
+              <a:t>and</a:t>
+            </a:r>
+            <a:br>
+              <a:rPr lang="en-US" sz="2000" dirty="0" smtClean="0"/>
+            </a:br>
+            <a:r>
+              <a:rPr lang="en-US" sz="2000" dirty="0" smtClean="0"/>
+              <a:t>storing aggregated</a:t>
+            </a:r>
+          </a:p>
+          <a:p>
+            <a:pPr lvl="1"/>
+            <a:r>
+              <a:rPr lang="en-US" sz="2000" dirty="0" smtClean="0"/>
+              <a:t>results</a:t>
+            </a:r>
+            <a:endParaRPr lang="en-US" sz="2000" dirty="0" smtClean="0"/>
+          </a:p>
+        </p:txBody>
+      </p:sp>
+      <p:pic>
+        <p:nvPicPr>
+          <p:cNvPr id="6" name="Picture 5" descr="DASRequestFlow.pdf"/>
+          <p:cNvPicPr>
+            <a:picLocks noChangeAspect="1"/>
+          </p:cNvPicPr>
+          <p:nvPr/>
+        </p:nvPicPr>
+        <p:blipFill>
+          <a:blip r:embed="rId3">
+            <a:extLst>
+              <a:ext uri="{28A0092B-C50C-407E-A947-70E740481C1C}">
+                <a14:useLocalDpi xmlns:a14="http://schemas.microsoft.com/office/drawing/2010/main" val="0"/>
+              </a:ext>
+            </a:extLst>
+          </a:blip>
+          <a:stretch>
+            <a:fillRect/>
+          </a:stretch>
+        </p:blipFill>
+        <p:spPr>
+          <a:xfrm>
+            <a:off x="3886200" y="1219200"/>
+            <a:ext cx="5170521" cy="4050000"/>
+          </a:xfrm>
+          <a:prstGeom prst="rect">
+            <a:avLst/>
+          </a:prstGeom>
+        </p:spPr>
+      </p:pic>
     </p:spTree>
     <p:extLst>
       <p:ext uri="{BB962C8B-B14F-4D97-AF65-F5344CB8AC3E}">
@@ -11638,6 +11665,36 @@
           <a:chExt cx="0" cy="0"/>
         </a:xfrm>
       </p:grpSpPr>
+      <p:pic>
+        <p:nvPicPr>
+          <p:cNvPr id="6" name="Picture 5" descr="das_stat.pdf"/>
+          <p:cNvPicPr>
+            <a:picLocks noChangeAspect="1"/>
+          </p:cNvPicPr>
+          <p:nvPr/>
+        </p:nvPicPr>
+        <p:blipFill>
+          <a:blip r:embed="rId3">
+            <a:extLst>
+              <a:ext uri="{28A0092B-C50C-407E-A947-70E740481C1C}">
+                <a14:useLocalDpi xmlns:a14="http://schemas.microsoft.com/office/drawing/2010/main" val="0"/>
+              </a:ext>
+            </a:extLst>
+          </a:blip>
+          <a:stretch>
+            <a:fillRect/>
+          </a:stretch>
+        </p:blipFill>
+        <p:spPr>
+          <a:xfrm>
+            <a:off x="4251600" y="806400"/>
+            <a:ext cx="5176800" cy="5176800"/>
+          </a:xfrm>
+          <a:prstGeom prst="rect">
+            <a:avLst/>
+          </a:prstGeom>
+        </p:spPr>
+      </p:pic>
       <p:sp>
         <p:nvSpPr>
           <p:cNvPr id="2" name="Date Placeholder 1"/>
@@ -11882,60 +11939,6 @@
           </a:p>
         </p:txBody>
       </p:sp>
-      <p:pic>
-        <p:nvPicPr>
-          <p:cNvPr id="1026" name="Picture 2"/>
-          <p:cNvPicPr>
-            <a:picLocks noChangeAspect="1" noChangeArrowheads="1"/>
-          </p:cNvPicPr>
-          <p:nvPr/>
-        </p:nvPicPr>
-        <p:blipFill>
-          <a:blip r:embed="rId3">
-            <a:extLst>
-              <a:ext uri="{28A0092B-C50C-407E-A947-70E740481C1C}">
-                <a14:useLocalDpi xmlns:a14="http://schemas.microsoft.com/office/drawing/2010/main" val="0"/>
-              </a:ext>
-            </a:extLst>
-          </a:blip>
-          <a:srcRect/>
-          <a:stretch>
-            <a:fillRect/>
-          </a:stretch>
-        </p:blipFill>
-        <p:spPr bwMode="auto">
-          <a:xfrm>
-            <a:off x="4536173" y="1083364"/>
-            <a:ext cx="4607827" cy="4564863"/>
-          </a:xfrm>
-          <a:prstGeom prst="rect">
-            <a:avLst/>
-          </a:prstGeom>
-          <a:noFill/>
-          <a:ln>
-            <a:noFill/>
-          </a:ln>
-          <a:extLst>
-            <a:ext uri="{909E8E84-426E-40dd-AFC4-6F175D3DCCD1}">
-              <a14:hiddenFill xmlns:a14="http://schemas.microsoft.com/office/drawing/2010/main">
-                <a:solidFill>
-                  <a:schemeClr val="accent1"/>
-                </a:solidFill>
-              </a14:hiddenFill>
-            </a:ext>
-            <a:ext uri="{91240B29-F687-4f45-9708-019B960494DF}">
-              <a14:hiddenLine xmlns:a14="http://schemas.microsoft.com/office/drawing/2010/main" w="9525">
-                <a:solidFill>
-                  <a:schemeClr val="tx1"/>
-                </a:solidFill>
-                <a:miter lim="800000"/>
-                <a:headEnd/>
-                <a:tailEnd/>
-              </a14:hiddenLine>
-            </a:ext>
-          </a:extLst>
-        </p:spPr>
-      </p:pic>
       <p:sp>
         <p:nvSpPr>
           <p:cNvPr id="8" name="Rectangle 3"/>
@@ -11946,7 +11949,7 @@
         </p:nvSpPr>
         <p:spPr bwMode="auto">
           <a:xfrm>
-            <a:off x="446858" y="1083364"/>
+            <a:off x="338400" y="1227600"/>
             <a:ext cx="4277542" cy="5012635"/>
           </a:xfrm>
           <a:prstGeom prst="rect">
@@ -14283,11 +14286,7 @@
             </a:pPr>
             <a:r>
               <a:rPr lang="en-US" altLang="en-US" sz="1400" smtClean="0"/>
-              <a:t>~</a:t>
-            </a:r>
-            <a:r>
-              <a:rPr lang="en-US" altLang="en-US" sz="1400" smtClean="0"/>
-              <a:t>10</a:t>
+              <a:t>~10</a:t>
             </a:r>
             <a:r>
               <a:rPr lang="en-US" altLang="en-US" sz="1400" baseline="30000" smtClean="0"/>

</xml_diff>

<commit_message>
update DAS Request diagram and the slides to go with it
</commit_message>
<xml_diff>
--- a/CMS-Data-Management/Slides/The CMS Data Management System.pptx
+++ b/CMS-Data-Management/Slides/The CMS Data Management System.pptx
@@ -10313,12 +10313,20 @@
               <a:buAutoNum type="arabicPeriod"/>
             </a:pPr>
             <a:r>
-              <a:rPr lang="en-US" dirty="0">
+              <a:rPr lang="en-US" dirty="0" smtClean="0">
                 <a:latin typeface="Verdana" panose="020B0604030504040204" pitchFamily="34" charset="0"/>
                 <a:ea typeface="Verdana" panose="020B0604030504040204" pitchFamily="34" charset="0"/>
                 <a:cs typeface="Verdana" panose="020B0604030504040204" pitchFamily="34" charset="0"/>
               </a:rPr>
-              <a:t>T. Wildish: </a:t>
+              <a:t>C-H Huang</a:t>
+            </a:r>
+            <a:r>
+              <a:rPr lang="en-US" dirty="0" smtClean="0">
+                <a:latin typeface="Verdana" panose="020B0604030504040204" pitchFamily="34" charset="0"/>
+                <a:ea typeface="Verdana" panose="020B0604030504040204" pitchFamily="34" charset="0"/>
+                <a:cs typeface="Verdana" panose="020B0604030504040204" pitchFamily="34" charset="0"/>
+              </a:rPr>
+              <a:t>: </a:t>
             </a:r>
             <a:r>
               <a:rPr lang="en-US" dirty="0" smtClean="0">
@@ -15529,15 +15537,23 @@
             </a:pPr>
             <a:r>
               <a:rPr lang="en-US" altLang="en-US" sz="1400" dirty="0" smtClean="0"/>
-              <a:t>~10</a:t>
-            </a:r>
-            <a:r>
-              <a:rPr lang="en-US" altLang="en-US" sz="1400" baseline="30000" dirty="0"/>
-              <a:t>9</a:t>
+              <a:t>~</a:t>
             </a:r>
             <a:r>
               <a:rPr lang="en-US" altLang="en-US" sz="1400" dirty="0" smtClean="0"/>
-              <a:t> events/year</a:t>
+              <a:t>10</a:t>
+            </a:r>
+            <a:r>
+              <a:rPr lang="en-US" altLang="en-US" sz="1400" baseline="30000" dirty="0" smtClean="0"/>
+              <a:t>10</a:t>
+            </a:r>
+            <a:r>
+              <a:rPr lang="en-US" altLang="en-US" sz="1400" dirty="0" smtClean="0"/>
+              <a:t> </a:t>
+            </a:r>
+            <a:r>
+              <a:rPr lang="en-US" altLang="en-US" sz="1400" dirty="0" smtClean="0"/>
+              <a:t>events/year</a:t>
             </a:r>
             <a:endParaRPr lang="en-US" altLang="en-US" sz="1400" dirty="0"/>
           </a:p>

</xml_diff>